<commit_message>
this is right tasty pastry
</commit_message>
<xml_diff>
--- a/PowerPoint/Sara PPT.pptx
+++ b/PowerPoint/Sara PPT.pptx
@@ -7808,10 +7808,9 @@
           </a:p>
           <a:p>
             <a:r>
-              <a:rPr lang="en-US" dirty="0" err="1" smtClean="0"/>
-              <a:t>dssddsds</a:t>
-            </a:r>
-            <a:endParaRPr lang="en-US" dirty="0" smtClean="0"/>
+              <a:rPr lang="en-US" dirty="0" smtClean="0"/>
+              <a:t>Banana</a:t>
+            </a:r>
           </a:p>
           <a:p>
             <a:r>
@@ -7831,14 +7830,14 @@
           <p:nvPr>
             <p:extLst>
               <p:ext uri="{D42A27DB-BD31-4B8C-83A1-F6EECF244321}">
-                <p14:modId xmlns:p14="http://schemas.microsoft.com/office/powerpoint/2010/main" val="444910751"/>
+                <p14:modId xmlns:p14="http://schemas.microsoft.com/office/powerpoint/2010/main" val="278687297"/>
               </p:ext>
             </p:extLst>
           </p:nvPr>
         </p:nvGraphicFramePr>
         <p:xfrm>
           <a:off x="3484880" y="2336873"/>
-          <a:ext cx="8127999" cy="1483360"/>
+          <a:ext cx="8127999" cy="1854200"/>
         </p:xfrm>
         <a:graphic>
           <a:graphicData uri="http://schemas.openxmlformats.org/drawingml/2006/table">
@@ -7933,7 +7932,7 @@
                     <a:bodyPr/>
                     <a:lstStyle/>
                     <a:p>
-                      <a:endParaRPr lang="en-US"/>
+                      <a:endParaRPr lang="en-US" dirty="0"/>
                     </a:p>
                   </a:txBody>
                   <a:tcPr/>
@@ -7943,7 +7942,15 @@
                     <a:bodyPr/>
                     <a:lstStyle/>
                     <a:p>
-                      <a:endParaRPr lang="en-US"/>
+                      <a:r>
+                        <a:rPr lang="en-US" dirty="0" smtClean="0"/>
+                        <a:t>Woo </a:t>
+                      </a:r>
+                      <a:r>
+                        <a:rPr lang="en-US" dirty="0" err="1" smtClean="0"/>
+                        <a:t>hoo</a:t>
+                      </a:r>
+                      <a:endParaRPr lang="en-US" dirty="0"/>
                     </a:p>
                   </a:txBody>
                   <a:tcPr/>
@@ -7953,7 +7960,7 @@
                     <a:bodyPr/>
                     <a:lstStyle/>
                     <a:p>
-                      <a:endParaRPr lang="en-US"/>
+                      <a:endParaRPr lang="en-US" dirty="0"/>
                     </a:p>
                   </a:txBody>
                   <a:tcPr/>
@@ -7965,7 +7972,11 @@
                     <a:bodyPr/>
                     <a:lstStyle/>
                     <a:p>
-                      <a:endParaRPr lang="en-US"/>
+                      <a:r>
+                        <a:rPr lang="en-US" dirty="0" err="1" smtClean="0"/>
+                        <a:t>gandango</a:t>
+                      </a:r>
+                      <a:endParaRPr lang="en-US" dirty="0"/>
                     </a:p>
                   </a:txBody>
                   <a:tcPr/>
@@ -7991,6 +8002,38 @@
                   <a:tcPr/>
                 </a:tc>
               </a:tr>
+              <a:tr h="370840">
+                <a:tc>
+                  <a:txBody>
+                    <a:bodyPr/>
+                    <a:lstStyle/>
+                    <a:p>
+                      <a:endParaRPr lang="en-US"/>
+                    </a:p>
+                  </a:txBody>
+                  <a:tcPr/>
+                </a:tc>
+                <a:tc>
+                  <a:txBody>
+                    <a:bodyPr/>
+                    <a:lstStyle/>
+                    <a:p>
+                      <a:endParaRPr lang="en-US" dirty="0"/>
+                    </a:p>
+                  </a:txBody>
+                  <a:tcPr/>
+                </a:tc>
+                <a:tc>
+                  <a:txBody>
+                    <a:bodyPr/>
+                    <a:lstStyle/>
+                    <a:p>
+                      <a:endParaRPr lang="en-US" dirty="0"/>
+                    </a:p>
+                  </a:txBody>
+                  <a:tcPr/>
+                </a:tc>
+              </a:tr>
             </a:tbl>
           </a:graphicData>
         </a:graphic>
@@ -8004,11 +8047,16 @@
         <p:spPr>
           <a:xfrm>
             <a:off x="3708400" y="4808429"/>
-            <a:ext cx="1645920" cy="1127760"/>
+            <a:ext cx="4145280" cy="393491"/>
           </a:xfrm>
           <a:prstGeom prst="rect">
             <a:avLst/>
           </a:prstGeom>
+          <a:solidFill>
+            <a:schemeClr val="accent3">
+              <a:lumMod val="75000"/>
+            </a:schemeClr>
+          </a:solidFill>
         </p:spPr>
         <p:style>
           <a:lnRef idx="2">
@@ -8047,7 +8095,7 @@
         </p:nvSpPr>
         <p:spPr>
           <a:xfrm>
-            <a:off x="5858716" y="4752967"/>
+            <a:off x="3708400" y="5201920"/>
             <a:ext cx="1645920" cy="1127760"/>
           </a:xfrm>
           <a:prstGeom prst="rect">
@@ -8091,7 +8139,7 @@
         </p:nvSpPr>
         <p:spPr>
           <a:xfrm>
-            <a:off x="8009033" y="4745138"/>
+            <a:off x="6207760" y="5261924"/>
             <a:ext cx="1645920" cy="1127760"/>
           </a:xfrm>
           <a:prstGeom prst="rect">

</xml_diff>

<commit_message>
Reverted to version 1
</commit_message>
<xml_diff>
--- a/PowerPoint/Sara PPT.pptx
+++ b/PowerPoint/Sara PPT.pptx
@@ -6,7 +6,6 @@
   </p:sldMasterIdLst>
   <p:sldIdLst>
     <p:sldId id="256" r:id="rId2"/>
-    <p:sldId id="257" r:id="rId3"/>
   </p:sldIdLst>
   <p:sldSz cx="12192000" cy="6858000"/>
   <p:notesSz cx="6858000" cy="9144000"/>
@@ -105,11 +104,6 @@
       </a:defRPr>
     </a:lvl9pPr>
   </p:defaultTextStyle>
-  <p:extLst>
-    <p:ext uri="{EFAFB233-063F-42B5-8137-9DF3F51BA10A}">
-      <p15:sldGuideLst xmlns:p15="http://schemas.microsoft.com/office/powerpoint/2012/main"/>
-    </p:ext>
-  </p:extLst>
 </p:presentation>
 </file>
 
@@ -7677,11 +7671,7 @@
           <a:bodyPr/>
           <a:lstStyle/>
           <a:p>
-            <a:r>
-              <a:rPr lang="en-US" dirty="0" smtClean="0"/>
-              <a:t>Sara Demo</a:t>
-            </a:r>
-            <a:endParaRPr lang="en-US" dirty="0"/>
+            <a:endParaRPr lang="en-US"/>
           </a:p>
         </p:txBody>
       </p:sp>
@@ -7708,429 +7698,6 @@
     <p:extLst>
       <p:ext uri="{BB962C8B-B14F-4D97-AF65-F5344CB8AC3E}">
         <p14:creationId xmlns:p14="http://schemas.microsoft.com/office/powerpoint/2010/main" val="3571244194"/>
-      </p:ext>
-    </p:extLst>
-  </p:cSld>
-  <p:clrMapOvr>
-    <a:masterClrMapping/>
-  </p:clrMapOvr>
-</p:sld>
-</file>
-
-<file path=ppt/slides/slide2.xml><?xml version="1.0" encoding="utf-8"?>
-<p:sld xmlns:a="http://schemas.openxmlformats.org/drawingml/2006/main" xmlns:r="http://schemas.openxmlformats.org/officeDocument/2006/relationships" xmlns:p="http://schemas.openxmlformats.org/presentationml/2006/main">
-  <p:cSld>
-    <p:spTree>
-      <p:nvGrpSpPr>
-        <p:cNvPr id="1" name=""/>
-        <p:cNvGrpSpPr/>
-        <p:nvPr/>
-      </p:nvGrpSpPr>
-      <p:grpSpPr>
-        <a:xfrm>
-          <a:off x="0" y="0"/>
-          <a:ext cx="0" cy="0"/>
-          <a:chOff x="0" y="0"/>
-          <a:chExt cx="0" cy="0"/>
-        </a:xfrm>
-      </p:grpSpPr>
-      <p:sp>
-        <p:nvSpPr>
-          <p:cNvPr id="2" name="Title 1"/>
-          <p:cNvSpPr>
-            <a:spLocks noGrp="1"/>
-          </p:cNvSpPr>
-          <p:nvPr>
-            <p:ph type="title"/>
-          </p:nvPr>
-        </p:nvSpPr>
-        <p:spPr/>
-        <p:txBody>
-          <a:bodyPr/>
-          <a:lstStyle/>
-          <a:p>
-            <a:r>
-              <a:rPr lang="en-US" dirty="0" err="1" smtClean="0"/>
-              <a:t>Slie</a:t>
-            </a:r>
-            <a:r>
-              <a:rPr lang="en-US" dirty="0" smtClean="0"/>
-              <a:t> title</a:t>
-            </a:r>
-            <a:endParaRPr lang="en-US" dirty="0"/>
-          </a:p>
-        </p:txBody>
-      </p:sp>
-      <p:sp>
-        <p:nvSpPr>
-          <p:cNvPr id="3" name="Content Placeholder 2"/>
-          <p:cNvSpPr>
-            <a:spLocks noGrp="1"/>
-          </p:cNvSpPr>
-          <p:nvPr>
-            <p:ph idx="1"/>
-          </p:nvPr>
-        </p:nvSpPr>
-        <p:spPr>
-          <a:xfrm>
-            <a:off x="680321" y="2336873"/>
-            <a:ext cx="3983119" cy="3599316"/>
-          </a:xfrm>
-        </p:spPr>
-        <p:txBody>
-          <a:bodyPr/>
-          <a:lstStyle/>
-          <a:p>
-            <a:r>
-              <a:rPr lang="en-US" dirty="0" err="1" smtClean="0"/>
-              <a:t>Bkab</a:t>
-            </a:r>
-            <a:r>
-              <a:rPr lang="en-US" dirty="0" smtClean="0"/>
-              <a:t> </a:t>
-            </a:r>
-          </a:p>
-          <a:p>
-            <a:endParaRPr lang="en-US" dirty="0"/>
-          </a:p>
-          <a:p>
-            <a:r>
-              <a:rPr lang="en-US" dirty="0" err="1" smtClean="0"/>
-              <a:t>Bbfbbfs</a:t>
-            </a:r>
-            <a:r>
-              <a:rPr lang="en-US" dirty="0" smtClean="0"/>
-              <a:t>’’’</a:t>
-            </a:r>
-          </a:p>
-          <a:p>
-            <a:endParaRPr lang="en-US" dirty="0"/>
-          </a:p>
-          <a:p>
-            <a:r>
-              <a:rPr lang="en-US" dirty="0" err="1" smtClean="0"/>
-              <a:t>dssddsds</a:t>
-            </a:r>
-            <a:endParaRPr lang="en-US" dirty="0" smtClean="0"/>
-          </a:p>
-          <a:p>
-            <a:r>
-              <a:rPr lang="en-US" dirty="0" err="1" smtClean="0"/>
-              <a:t>dssddss</a:t>
-            </a:r>
-            <a:endParaRPr lang="en-US" dirty="0"/>
-          </a:p>
-        </p:txBody>
-      </p:sp>
-      <p:graphicFrame>
-        <p:nvGraphicFramePr>
-          <p:cNvPr id="4" name="Table 3"/>
-          <p:cNvGraphicFramePr>
-            <a:graphicFrameLocks noGrp="1"/>
-          </p:cNvGraphicFramePr>
-          <p:nvPr>
-            <p:extLst>
-              <p:ext uri="{D42A27DB-BD31-4B8C-83A1-F6EECF244321}">
-                <p14:modId xmlns:p14="http://schemas.microsoft.com/office/powerpoint/2010/main" val="444910751"/>
-              </p:ext>
-            </p:extLst>
-          </p:nvPr>
-        </p:nvGraphicFramePr>
-        <p:xfrm>
-          <a:off x="3484880" y="2336873"/>
-          <a:ext cx="8127999" cy="1483360"/>
-        </p:xfrm>
-        <a:graphic>
-          <a:graphicData uri="http://schemas.openxmlformats.org/drawingml/2006/table">
-            <a:tbl>
-              <a:tblPr firstRow="1" bandRow="1">
-                <a:tableStyleId>{5C22544A-7EE6-4342-B048-85BDC9FD1C3A}</a:tableStyleId>
-              </a:tblPr>
-              <a:tblGrid>
-                <a:gridCol w="2709333"/>
-                <a:gridCol w="2709333"/>
-                <a:gridCol w="2709333"/>
-              </a:tblGrid>
-              <a:tr h="370840">
-                <a:tc>
-                  <a:txBody>
-                    <a:bodyPr/>
-                    <a:lstStyle/>
-                    <a:p>
-                      <a:r>
-                        <a:rPr lang="en-US" dirty="0" smtClean="0"/>
-                        <a:t>sausage</a:t>
-                      </a:r>
-                      <a:endParaRPr lang="en-US" dirty="0"/>
-                    </a:p>
-                  </a:txBody>
-                  <a:tcPr/>
-                </a:tc>
-                <a:tc>
-                  <a:txBody>
-                    <a:bodyPr/>
-                    <a:lstStyle/>
-                    <a:p>
-                      <a:r>
-                        <a:rPr lang="en-US" dirty="0" smtClean="0"/>
-                        <a:t>bacon</a:t>
-                      </a:r>
-                      <a:endParaRPr lang="en-US" dirty="0"/>
-                    </a:p>
-                  </a:txBody>
-                  <a:tcPr/>
-                </a:tc>
-                <a:tc>
-                  <a:txBody>
-                    <a:bodyPr/>
-                    <a:lstStyle/>
-                    <a:p>
-                      <a:r>
-                        <a:rPr lang="en-US" dirty="0" smtClean="0"/>
-                        <a:t>egg</a:t>
-                      </a:r>
-                      <a:endParaRPr lang="en-US" dirty="0"/>
-                    </a:p>
-                  </a:txBody>
-                  <a:tcPr/>
-                </a:tc>
-              </a:tr>
-              <a:tr h="370840">
-                <a:tc>
-                  <a:txBody>
-                    <a:bodyPr/>
-                    <a:lstStyle/>
-                    <a:p>
-                      <a:endParaRPr lang="en-US"/>
-                    </a:p>
-                  </a:txBody>
-                  <a:tcPr/>
-                </a:tc>
-                <a:tc>
-                  <a:txBody>
-                    <a:bodyPr/>
-                    <a:lstStyle/>
-                    <a:p>
-                      <a:endParaRPr lang="en-US"/>
-                    </a:p>
-                  </a:txBody>
-                  <a:tcPr/>
-                </a:tc>
-                <a:tc>
-                  <a:txBody>
-                    <a:bodyPr/>
-                    <a:lstStyle/>
-                    <a:p>
-                      <a:endParaRPr lang="en-US"/>
-                    </a:p>
-                  </a:txBody>
-                  <a:tcPr/>
-                </a:tc>
-              </a:tr>
-              <a:tr h="370840">
-                <a:tc>
-                  <a:txBody>
-                    <a:bodyPr/>
-                    <a:lstStyle/>
-                    <a:p>
-                      <a:endParaRPr lang="en-US"/>
-                    </a:p>
-                  </a:txBody>
-                  <a:tcPr/>
-                </a:tc>
-                <a:tc>
-                  <a:txBody>
-                    <a:bodyPr/>
-                    <a:lstStyle/>
-                    <a:p>
-                      <a:endParaRPr lang="en-US"/>
-                    </a:p>
-                  </a:txBody>
-                  <a:tcPr/>
-                </a:tc>
-                <a:tc>
-                  <a:txBody>
-                    <a:bodyPr/>
-                    <a:lstStyle/>
-                    <a:p>
-                      <a:endParaRPr lang="en-US"/>
-                    </a:p>
-                  </a:txBody>
-                  <a:tcPr/>
-                </a:tc>
-              </a:tr>
-              <a:tr h="370840">
-                <a:tc>
-                  <a:txBody>
-                    <a:bodyPr/>
-                    <a:lstStyle/>
-                    <a:p>
-                      <a:endParaRPr lang="en-US"/>
-                    </a:p>
-                  </a:txBody>
-                  <a:tcPr/>
-                </a:tc>
-                <a:tc>
-                  <a:txBody>
-                    <a:bodyPr/>
-                    <a:lstStyle/>
-                    <a:p>
-                      <a:endParaRPr lang="en-US"/>
-                    </a:p>
-                  </a:txBody>
-                  <a:tcPr/>
-                </a:tc>
-                <a:tc>
-                  <a:txBody>
-                    <a:bodyPr/>
-                    <a:lstStyle/>
-                    <a:p>
-                      <a:endParaRPr lang="en-US" dirty="0"/>
-                    </a:p>
-                  </a:txBody>
-                  <a:tcPr/>
-                </a:tc>
-              </a:tr>
-            </a:tbl>
-          </a:graphicData>
-        </a:graphic>
-      </p:graphicFrame>
-      <p:sp>
-        <p:nvSpPr>
-          <p:cNvPr id="5" name="Rectangle 4"/>
-          <p:cNvSpPr/>
-          <p:nvPr/>
-        </p:nvSpPr>
-        <p:spPr>
-          <a:xfrm>
-            <a:off x="3708400" y="4808429"/>
-            <a:ext cx="1645920" cy="1127760"/>
-          </a:xfrm>
-          <a:prstGeom prst="rect">
-            <a:avLst/>
-          </a:prstGeom>
-        </p:spPr>
-        <p:style>
-          <a:lnRef idx="2">
-            <a:schemeClr val="accent1">
-              <a:shade val="50000"/>
-            </a:schemeClr>
-          </a:lnRef>
-          <a:fillRef idx="1">
-            <a:schemeClr val="accent1"/>
-          </a:fillRef>
-          <a:effectRef idx="0">
-            <a:schemeClr val="accent1"/>
-          </a:effectRef>
-          <a:fontRef idx="minor">
-            <a:schemeClr val="lt1"/>
-          </a:fontRef>
-        </p:style>
-        <p:txBody>
-          <a:bodyPr rtlCol="0" anchor="ctr"/>
-          <a:lstStyle/>
-          <a:p>
-            <a:pPr algn="ctr"/>
-            <a:r>
-              <a:rPr lang="en-US" dirty="0" smtClean="0"/>
-              <a:t>one</a:t>
-            </a:r>
-            <a:endParaRPr lang="en-US" dirty="0"/>
-          </a:p>
-        </p:txBody>
-      </p:sp>
-      <p:sp>
-        <p:nvSpPr>
-          <p:cNvPr id="6" name="Rectangle 5"/>
-          <p:cNvSpPr/>
-          <p:nvPr/>
-        </p:nvSpPr>
-        <p:spPr>
-          <a:xfrm>
-            <a:off x="5858716" y="4752967"/>
-            <a:ext cx="1645920" cy="1127760"/>
-          </a:xfrm>
-          <a:prstGeom prst="rect">
-            <a:avLst/>
-          </a:prstGeom>
-        </p:spPr>
-        <p:style>
-          <a:lnRef idx="2">
-            <a:schemeClr val="accent1">
-              <a:shade val="50000"/>
-            </a:schemeClr>
-          </a:lnRef>
-          <a:fillRef idx="1">
-            <a:schemeClr val="accent1"/>
-          </a:fillRef>
-          <a:effectRef idx="0">
-            <a:schemeClr val="accent1"/>
-          </a:effectRef>
-          <a:fontRef idx="minor">
-            <a:schemeClr val="lt1"/>
-          </a:fontRef>
-        </p:style>
-        <p:txBody>
-          <a:bodyPr rtlCol="0" anchor="ctr"/>
-          <a:lstStyle/>
-          <a:p>
-            <a:pPr algn="ctr"/>
-            <a:r>
-              <a:rPr lang="en-US" dirty="0" smtClean="0"/>
-              <a:t>two</a:t>
-            </a:r>
-            <a:endParaRPr lang="en-US" dirty="0"/>
-          </a:p>
-        </p:txBody>
-      </p:sp>
-      <p:sp>
-        <p:nvSpPr>
-          <p:cNvPr id="7" name="Rectangle 6"/>
-          <p:cNvSpPr/>
-          <p:nvPr/>
-        </p:nvSpPr>
-        <p:spPr>
-          <a:xfrm>
-            <a:off x="8009033" y="4745138"/>
-            <a:ext cx="1645920" cy="1127760"/>
-          </a:xfrm>
-          <a:prstGeom prst="rect">
-            <a:avLst/>
-          </a:prstGeom>
-        </p:spPr>
-        <p:style>
-          <a:lnRef idx="2">
-            <a:schemeClr val="accent1">
-              <a:shade val="50000"/>
-            </a:schemeClr>
-          </a:lnRef>
-          <a:fillRef idx="1">
-            <a:schemeClr val="accent1"/>
-          </a:fillRef>
-          <a:effectRef idx="0">
-            <a:schemeClr val="accent1"/>
-          </a:effectRef>
-          <a:fontRef idx="minor">
-            <a:schemeClr val="lt1"/>
-          </a:fontRef>
-        </p:style>
-        <p:txBody>
-          <a:bodyPr rtlCol="0" anchor="ctr"/>
-          <a:lstStyle/>
-          <a:p>
-            <a:pPr algn="ctr"/>
-            <a:r>
-              <a:rPr lang="en-US" dirty="0" smtClean="0"/>
-              <a:t>three</a:t>
-            </a:r>
-            <a:endParaRPr lang="en-US" dirty="0"/>
-          </a:p>
-        </p:txBody>
-      </p:sp>
-    </p:spTree>
-    <p:extLst>
-      <p:ext uri="{BB962C8B-B14F-4D97-AF65-F5344CB8AC3E}">
-        <p14:creationId xmlns:p14="http://schemas.microsoft.com/office/powerpoint/2010/main" val="2610004580"/>
       </p:ext>
     </p:extLst>
   </p:cSld>

</xml_diff>

<commit_message>
Reverted to version 6
</commit_message>
<xml_diff>
--- a/PowerPoint/Sara PPT.pptx
+++ b/PowerPoint/Sara PPT.pptx
@@ -6,7 +6,6 @@
   </p:sldMasterIdLst>
   <p:sldIdLst>
     <p:sldId id="256" r:id="rId2"/>
-    <p:sldId id="257" r:id="rId3"/>
   </p:sldIdLst>
   <p:sldSz cx="12192000" cy="6858000"/>
   <p:notesSz cx="6858000" cy="9144000"/>
@@ -105,11 +104,6 @@
       </a:defRPr>
     </a:lvl9pPr>
   </p:defaultTextStyle>
-  <p:extLst>
-    <p:ext uri="{EFAFB233-063F-42B5-8137-9DF3F51BA10A}">
-      <p15:sldGuideLst xmlns:p15="http://schemas.microsoft.com/office/powerpoint/2012/main"/>
-    </p:ext>
-  </p:extLst>
 </p:presentation>
 </file>
 
@@ -7677,11 +7671,7 @@
           <a:bodyPr/>
           <a:lstStyle/>
           <a:p>
-            <a:r>
-              <a:rPr lang="en-US" dirty="0" smtClean="0"/>
-              <a:t>Sara Demo</a:t>
-            </a:r>
-            <a:endParaRPr lang="en-US" dirty="0"/>
+            <a:endParaRPr lang="en-US"/>
           </a:p>
         </p:txBody>
       </p:sp>
@@ -7708,477 +7698,6 @@
     <p:extLst>
       <p:ext uri="{BB962C8B-B14F-4D97-AF65-F5344CB8AC3E}">
         <p14:creationId xmlns:p14="http://schemas.microsoft.com/office/powerpoint/2010/main" val="3571244194"/>
-      </p:ext>
-    </p:extLst>
-  </p:cSld>
-  <p:clrMapOvr>
-    <a:masterClrMapping/>
-  </p:clrMapOvr>
-</p:sld>
-</file>
-
-<file path=ppt/slides/slide2.xml><?xml version="1.0" encoding="utf-8"?>
-<p:sld xmlns:a="http://schemas.openxmlformats.org/drawingml/2006/main" xmlns:r="http://schemas.openxmlformats.org/officeDocument/2006/relationships" xmlns:p="http://schemas.openxmlformats.org/presentationml/2006/main">
-  <p:cSld>
-    <p:spTree>
-      <p:nvGrpSpPr>
-        <p:cNvPr id="1" name=""/>
-        <p:cNvGrpSpPr/>
-        <p:nvPr/>
-      </p:nvGrpSpPr>
-      <p:grpSpPr>
-        <a:xfrm>
-          <a:off x="0" y="0"/>
-          <a:ext cx="0" cy="0"/>
-          <a:chOff x="0" y="0"/>
-          <a:chExt cx="0" cy="0"/>
-        </a:xfrm>
-      </p:grpSpPr>
-      <p:sp>
-        <p:nvSpPr>
-          <p:cNvPr id="2" name="Title 1"/>
-          <p:cNvSpPr>
-            <a:spLocks noGrp="1"/>
-          </p:cNvSpPr>
-          <p:nvPr>
-            <p:ph type="title"/>
-          </p:nvPr>
-        </p:nvSpPr>
-        <p:spPr/>
-        <p:txBody>
-          <a:bodyPr/>
-          <a:lstStyle/>
-          <a:p>
-            <a:r>
-              <a:rPr lang="en-US" dirty="0" err="1" smtClean="0"/>
-              <a:t>Slie</a:t>
-            </a:r>
-            <a:r>
-              <a:rPr lang="en-US" dirty="0" smtClean="0"/>
-              <a:t> title</a:t>
-            </a:r>
-            <a:endParaRPr lang="en-US" dirty="0"/>
-          </a:p>
-        </p:txBody>
-      </p:sp>
-      <p:sp>
-        <p:nvSpPr>
-          <p:cNvPr id="3" name="Content Placeholder 2"/>
-          <p:cNvSpPr>
-            <a:spLocks noGrp="1"/>
-          </p:cNvSpPr>
-          <p:nvPr>
-            <p:ph idx="1"/>
-          </p:nvPr>
-        </p:nvSpPr>
-        <p:spPr>
-          <a:xfrm>
-            <a:off x="680321" y="2336873"/>
-            <a:ext cx="3983119" cy="3599316"/>
-          </a:xfrm>
-        </p:spPr>
-        <p:txBody>
-          <a:bodyPr/>
-          <a:lstStyle/>
-          <a:p>
-            <a:r>
-              <a:rPr lang="en-US" dirty="0" err="1" smtClean="0"/>
-              <a:t>Bkab</a:t>
-            </a:r>
-            <a:r>
-              <a:rPr lang="en-US" dirty="0" smtClean="0"/>
-              <a:t> </a:t>
-            </a:r>
-          </a:p>
-          <a:p>
-            <a:endParaRPr lang="en-US" dirty="0"/>
-          </a:p>
-          <a:p>
-            <a:r>
-              <a:rPr lang="en-US" dirty="0" err="1" smtClean="0"/>
-              <a:t>Bbfbbfs</a:t>
-            </a:r>
-            <a:r>
-              <a:rPr lang="en-US" dirty="0" smtClean="0"/>
-              <a:t>’’’</a:t>
-            </a:r>
-          </a:p>
-          <a:p>
-            <a:endParaRPr lang="en-US" dirty="0"/>
-          </a:p>
-          <a:p>
-            <a:r>
-              <a:rPr lang="en-US" dirty="0" smtClean="0"/>
-              <a:t>Banana</a:t>
-            </a:r>
-          </a:p>
-          <a:p>
-            <a:r>
-              <a:rPr lang="en-US" dirty="0" err="1" smtClean="0"/>
-              <a:t>dssddss</a:t>
-            </a:r>
-            <a:endParaRPr lang="en-US" dirty="0"/>
-          </a:p>
-        </p:txBody>
-      </p:sp>
-      <p:graphicFrame>
-        <p:nvGraphicFramePr>
-          <p:cNvPr id="4" name="Table 3"/>
-          <p:cNvGraphicFramePr>
-            <a:graphicFrameLocks noGrp="1"/>
-          </p:cNvGraphicFramePr>
-          <p:nvPr>
-            <p:extLst>
-              <p:ext uri="{D42A27DB-BD31-4B8C-83A1-F6EECF244321}">
-                <p14:modId xmlns:p14="http://schemas.microsoft.com/office/powerpoint/2010/main" val="278687297"/>
-              </p:ext>
-            </p:extLst>
-          </p:nvPr>
-        </p:nvGraphicFramePr>
-        <p:xfrm>
-          <a:off x="3484880" y="2336873"/>
-          <a:ext cx="8127999" cy="1854200"/>
-        </p:xfrm>
-        <a:graphic>
-          <a:graphicData uri="http://schemas.openxmlformats.org/drawingml/2006/table">
-            <a:tbl>
-              <a:tblPr firstRow="1" bandRow="1">
-                <a:tableStyleId>{5C22544A-7EE6-4342-B048-85BDC9FD1C3A}</a:tableStyleId>
-              </a:tblPr>
-              <a:tblGrid>
-                <a:gridCol w="2709333"/>
-                <a:gridCol w="2709333"/>
-                <a:gridCol w="2709333"/>
-              </a:tblGrid>
-              <a:tr h="370840">
-                <a:tc>
-                  <a:txBody>
-                    <a:bodyPr/>
-                    <a:lstStyle/>
-                    <a:p>
-                      <a:r>
-                        <a:rPr lang="en-US" dirty="0" smtClean="0"/>
-                        <a:t>sausage</a:t>
-                      </a:r>
-                      <a:endParaRPr lang="en-US" dirty="0"/>
-                    </a:p>
-                  </a:txBody>
-                  <a:tcPr/>
-                </a:tc>
-                <a:tc>
-                  <a:txBody>
-                    <a:bodyPr/>
-                    <a:lstStyle/>
-                    <a:p>
-                      <a:r>
-                        <a:rPr lang="en-US" dirty="0" smtClean="0"/>
-                        <a:t>bacon</a:t>
-                      </a:r>
-                      <a:endParaRPr lang="en-US" dirty="0"/>
-                    </a:p>
-                  </a:txBody>
-                  <a:tcPr/>
-                </a:tc>
-                <a:tc>
-                  <a:txBody>
-                    <a:bodyPr/>
-                    <a:lstStyle/>
-                    <a:p>
-                      <a:r>
-                        <a:rPr lang="en-US" dirty="0" smtClean="0"/>
-                        <a:t>egg</a:t>
-                      </a:r>
-                      <a:endParaRPr lang="en-US" dirty="0"/>
-                    </a:p>
-                  </a:txBody>
-                  <a:tcPr/>
-                </a:tc>
-              </a:tr>
-              <a:tr h="370840">
-                <a:tc>
-                  <a:txBody>
-                    <a:bodyPr/>
-                    <a:lstStyle/>
-                    <a:p>
-                      <a:endParaRPr lang="en-US"/>
-                    </a:p>
-                  </a:txBody>
-                  <a:tcPr/>
-                </a:tc>
-                <a:tc>
-                  <a:txBody>
-                    <a:bodyPr/>
-                    <a:lstStyle/>
-                    <a:p>
-                      <a:endParaRPr lang="en-US"/>
-                    </a:p>
-                  </a:txBody>
-                  <a:tcPr/>
-                </a:tc>
-                <a:tc>
-                  <a:txBody>
-                    <a:bodyPr/>
-                    <a:lstStyle/>
-                    <a:p>
-                      <a:endParaRPr lang="en-US"/>
-                    </a:p>
-                  </a:txBody>
-                  <a:tcPr/>
-                </a:tc>
-              </a:tr>
-              <a:tr h="370840">
-                <a:tc>
-                  <a:txBody>
-                    <a:bodyPr/>
-                    <a:lstStyle/>
-                    <a:p>
-                      <a:endParaRPr lang="en-US" dirty="0"/>
-                    </a:p>
-                  </a:txBody>
-                  <a:tcPr/>
-                </a:tc>
-                <a:tc>
-                  <a:txBody>
-                    <a:bodyPr/>
-                    <a:lstStyle/>
-                    <a:p>
-                      <a:r>
-                        <a:rPr lang="en-US" dirty="0" smtClean="0"/>
-                        <a:t>Woo </a:t>
-                      </a:r>
-                      <a:r>
-                        <a:rPr lang="en-US" dirty="0" err="1" smtClean="0"/>
-                        <a:t>hoo</a:t>
-                      </a:r>
-                      <a:endParaRPr lang="en-US" dirty="0"/>
-                    </a:p>
-                  </a:txBody>
-                  <a:tcPr/>
-                </a:tc>
-                <a:tc>
-                  <a:txBody>
-                    <a:bodyPr/>
-                    <a:lstStyle/>
-                    <a:p>
-                      <a:endParaRPr lang="en-US" dirty="0"/>
-                    </a:p>
-                  </a:txBody>
-                  <a:tcPr/>
-                </a:tc>
-              </a:tr>
-              <a:tr h="370840">
-                <a:tc>
-                  <a:txBody>
-                    <a:bodyPr/>
-                    <a:lstStyle/>
-                    <a:p>
-                      <a:r>
-                        <a:rPr lang="en-US" dirty="0" err="1" smtClean="0"/>
-                        <a:t>gandango</a:t>
-                      </a:r>
-                      <a:endParaRPr lang="en-US" dirty="0"/>
-                    </a:p>
-                  </a:txBody>
-                  <a:tcPr/>
-                </a:tc>
-                <a:tc>
-                  <a:txBody>
-                    <a:bodyPr/>
-                    <a:lstStyle/>
-                    <a:p>
-                      <a:endParaRPr lang="en-US"/>
-                    </a:p>
-                  </a:txBody>
-                  <a:tcPr/>
-                </a:tc>
-                <a:tc>
-                  <a:txBody>
-                    <a:bodyPr/>
-                    <a:lstStyle/>
-                    <a:p>
-                      <a:endParaRPr lang="en-US" dirty="0"/>
-                    </a:p>
-                  </a:txBody>
-                  <a:tcPr/>
-                </a:tc>
-              </a:tr>
-              <a:tr h="370840">
-                <a:tc>
-                  <a:txBody>
-                    <a:bodyPr/>
-                    <a:lstStyle/>
-                    <a:p>
-                      <a:endParaRPr lang="en-US"/>
-                    </a:p>
-                  </a:txBody>
-                  <a:tcPr/>
-                </a:tc>
-                <a:tc>
-                  <a:txBody>
-                    <a:bodyPr/>
-                    <a:lstStyle/>
-                    <a:p>
-                      <a:endParaRPr lang="en-US" dirty="0"/>
-                    </a:p>
-                  </a:txBody>
-                  <a:tcPr/>
-                </a:tc>
-                <a:tc>
-                  <a:txBody>
-                    <a:bodyPr/>
-                    <a:lstStyle/>
-                    <a:p>
-                      <a:endParaRPr lang="en-US" dirty="0"/>
-                    </a:p>
-                  </a:txBody>
-                  <a:tcPr/>
-                </a:tc>
-              </a:tr>
-            </a:tbl>
-          </a:graphicData>
-        </a:graphic>
-      </p:graphicFrame>
-      <p:sp>
-        <p:nvSpPr>
-          <p:cNvPr id="5" name="Rectangle 4"/>
-          <p:cNvSpPr/>
-          <p:nvPr/>
-        </p:nvSpPr>
-        <p:spPr>
-          <a:xfrm>
-            <a:off x="3708400" y="4808429"/>
-            <a:ext cx="4145280" cy="393491"/>
-          </a:xfrm>
-          <a:prstGeom prst="rect">
-            <a:avLst/>
-          </a:prstGeom>
-          <a:solidFill>
-            <a:schemeClr val="accent3">
-              <a:lumMod val="75000"/>
-            </a:schemeClr>
-          </a:solidFill>
-        </p:spPr>
-        <p:style>
-          <a:lnRef idx="2">
-            <a:schemeClr val="accent1">
-              <a:shade val="50000"/>
-            </a:schemeClr>
-          </a:lnRef>
-          <a:fillRef idx="1">
-            <a:schemeClr val="accent1"/>
-          </a:fillRef>
-          <a:effectRef idx="0">
-            <a:schemeClr val="accent1"/>
-          </a:effectRef>
-          <a:fontRef idx="minor">
-            <a:schemeClr val="lt1"/>
-          </a:fontRef>
-        </p:style>
-        <p:txBody>
-          <a:bodyPr rtlCol="0" anchor="ctr"/>
-          <a:lstStyle/>
-          <a:p>
-            <a:pPr algn="ctr"/>
-            <a:r>
-              <a:rPr lang="en-US" dirty="0" smtClean="0"/>
-              <a:t>one</a:t>
-            </a:r>
-            <a:endParaRPr lang="en-US" dirty="0"/>
-          </a:p>
-        </p:txBody>
-      </p:sp>
-      <p:sp>
-        <p:nvSpPr>
-          <p:cNvPr id="6" name="Rectangle 5"/>
-          <p:cNvSpPr/>
-          <p:nvPr/>
-        </p:nvSpPr>
-        <p:spPr>
-          <a:xfrm>
-            <a:off x="3708400" y="5201920"/>
-            <a:ext cx="1645920" cy="1127760"/>
-          </a:xfrm>
-          <a:prstGeom prst="rect">
-            <a:avLst/>
-          </a:prstGeom>
-        </p:spPr>
-        <p:style>
-          <a:lnRef idx="2">
-            <a:schemeClr val="accent1">
-              <a:shade val="50000"/>
-            </a:schemeClr>
-          </a:lnRef>
-          <a:fillRef idx="1">
-            <a:schemeClr val="accent1"/>
-          </a:fillRef>
-          <a:effectRef idx="0">
-            <a:schemeClr val="accent1"/>
-          </a:effectRef>
-          <a:fontRef idx="minor">
-            <a:schemeClr val="lt1"/>
-          </a:fontRef>
-        </p:style>
-        <p:txBody>
-          <a:bodyPr rtlCol="0" anchor="ctr"/>
-          <a:lstStyle/>
-          <a:p>
-            <a:pPr algn="ctr"/>
-            <a:r>
-              <a:rPr lang="en-US" dirty="0" smtClean="0"/>
-              <a:t>two</a:t>
-            </a:r>
-            <a:endParaRPr lang="en-US" dirty="0"/>
-          </a:p>
-        </p:txBody>
-      </p:sp>
-      <p:sp>
-        <p:nvSpPr>
-          <p:cNvPr id="7" name="Rectangle 6"/>
-          <p:cNvSpPr/>
-          <p:nvPr/>
-        </p:nvSpPr>
-        <p:spPr>
-          <a:xfrm>
-            <a:off x="6207760" y="5261924"/>
-            <a:ext cx="1645920" cy="1127760"/>
-          </a:xfrm>
-          <a:prstGeom prst="rect">
-            <a:avLst/>
-          </a:prstGeom>
-        </p:spPr>
-        <p:style>
-          <a:lnRef idx="2">
-            <a:schemeClr val="accent1">
-              <a:shade val="50000"/>
-            </a:schemeClr>
-          </a:lnRef>
-          <a:fillRef idx="1">
-            <a:schemeClr val="accent1"/>
-          </a:fillRef>
-          <a:effectRef idx="0">
-            <a:schemeClr val="accent1"/>
-          </a:effectRef>
-          <a:fontRef idx="minor">
-            <a:schemeClr val="lt1"/>
-          </a:fontRef>
-        </p:style>
-        <p:txBody>
-          <a:bodyPr rtlCol="0" anchor="ctr"/>
-          <a:lstStyle/>
-          <a:p>
-            <a:pPr algn="ctr"/>
-            <a:r>
-              <a:rPr lang="en-US" dirty="0" smtClean="0"/>
-              <a:t>three</a:t>
-            </a:r>
-            <a:endParaRPr lang="en-US" dirty="0"/>
-          </a:p>
-        </p:txBody>
-      </p:sp>
-    </p:spTree>
-    <p:extLst>
-      <p:ext uri="{BB962C8B-B14F-4D97-AF65-F5344CB8AC3E}">
-        <p14:creationId xmlns:p14="http://schemas.microsoft.com/office/powerpoint/2010/main" val="2610004580"/>
       </p:ext>
     </p:extLst>
   </p:cSld>

</xml_diff>